<commit_message>
working 2 subMenus + presentation MJ part finished
</commit_message>
<xml_diff>
--- a/presentation/prezentacjaPMIK.pptx
+++ b/presentation/prezentacjaPMIK.pptx
@@ -6,19 +6,20 @@
     <p:sldMasterId id="2147483650" r:id="rId2"/>
   </p:sldMasterIdLst>
   <p:notesMasterIdLst>
-    <p:notesMasterId r:id="rId10"/>
+    <p:notesMasterId r:id="rId11"/>
   </p:notesMasterIdLst>
   <p:handoutMasterIdLst>
-    <p:handoutMasterId r:id="rId11"/>
+    <p:handoutMasterId r:id="rId12"/>
   </p:handoutMasterIdLst>
   <p:sldIdLst>
     <p:sldId id="256" r:id="rId3"/>
     <p:sldId id="257" r:id="rId4"/>
-    <p:sldId id="258" r:id="rId5"/>
-    <p:sldId id="259" r:id="rId6"/>
-    <p:sldId id="260" r:id="rId7"/>
-    <p:sldId id="261" r:id="rId8"/>
-    <p:sldId id="262" r:id="rId9"/>
+    <p:sldId id="259" r:id="rId5"/>
+    <p:sldId id="261" r:id="rId6"/>
+    <p:sldId id="258" r:id="rId7"/>
+    <p:sldId id="263" r:id="rId8"/>
+    <p:sldId id="260" r:id="rId9"/>
+    <p:sldId id="262" r:id="rId10"/>
   </p:sldIdLst>
   <p:sldSz cx="9144000" cy="6858000" type="screen4x3"/>
   <p:notesSz cx="6858000" cy="9144000"/>
@@ -1021,7 +1022,7 @@
           <a:p>
             <a:fld id="{07A8AEF1-47DA-4362-B0EF-15FDFF98AF35}" type="datetime1">
               <a:rPr lang="en-US" altLang="ru-RU" smtClean="0"/>
-              <a:t>4/6/2024</a:t>
+              <a:t>4/9/2024</a:t>
             </a:fld>
             <a:endParaRPr lang="en-GB" altLang="ru-RU"/>
           </a:p>
@@ -1217,7 +1218,7 @@
           <a:p>
             <a:fld id="{D76D56D7-5D03-414A-8E05-0FCDEC8661BF}" type="datetime1">
               <a:rPr lang="en-US" altLang="ru-RU" smtClean="0"/>
-              <a:t>4/6/2024</a:t>
+              <a:t>4/9/2024</a:t>
             </a:fld>
             <a:endParaRPr lang="en-GB" altLang="ru-RU"/>
           </a:p>
@@ -1421,7 +1422,7 @@
           <a:p>
             <a:fld id="{FFC01429-4064-44A5-B1FC-336EAE3DB092}" type="datetime1">
               <a:rPr lang="en-US" altLang="ru-RU" smtClean="0"/>
-              <a:t>4/6/2024</a:t>
+              <a:t>4/9/2024</a:t>
             </a:fld>
             <a:endParaRPr lang="ru-RU" altLang="ru-RU"/>
           </a:p>
@@ -1608,7 +1609,7 @@
           <a:p>
             <a:fld id="{1DC2B165-2EE1-4FB2-B9BF-05EE26C42DCD}" type="datetime1">
               <a:rPr lang="en-US" altLang="ru-RU" smtClean="0"/>
-              <a:t>4/6/2024</a:t>
+              <a:t>4/9/2024</a:t>
             </a:fld>
             <a:endParaRPr lang="ru-RU" altLang="ru-RU"/>
           </a:p>
@@ -1817,7 +1818,7 @@
           <a:p>
             <a:fld id="{5ACFF487-E75E-457F-B8FD-967E59BE612D}" type="datetime1">
               <a:rPr lang="en-US" altLang="ru-RU" smtClean="0"/>
-              <a:t>4/6/2024</a:t>
+              <a:t>4/9/2024</a:t>
             </a:fld>
             <a:endParaRPr lang="ru-RU" altLang="ru-RU"/>
           </a:p>
@@ -2122,7 +2123,7 @@
           <a:p>
             <a:fld id="{BC264BC4-F6C8-4FF2-B7EB-08ED5607D786}" type="datetime1">
               <a:rPr lang="en-US" altLang="ru-RU" smtClean="0"/>
-              <a:t>4/6/2024</a:t>
+              <a:t>4/9/2024</a:t>
             </a:fld>
             <a:endParaRPr lang="ru-RU" altLang="ru-RU"/>
           </a:p>
@@ -2566,7 +2567,7 @@
           <a:p>
             <a:fld id="{658F7032-246B-41DE-B6A3-FC95A37DC04C}" type="datetime1">
               <a:rPr lang="en-US" altLang="ru-RU" smtClean="0"/>
-              <a:t>4/6/2024</a:t>
+              <a:t>4/9/2024</a:t>
             </a:fld>
             <a:endParaRPr lang="ru-RU" altLang="ru-RU"/>
           </a:p>
@@ -2701,7 +2702,7 @@
           <a:p>
             <a:fld id="{A3E35D8B-3258-42B1-9104-12B20B993091}" type="datetime1">
               <a:rPr lang="en-US" altLang="ru-RU" smtClean="0"/>
-              <a:t>4/6/2024</a:t>
+              <a:t>4/9/2024</a:t>
             </a:fld>
             <a:endParaRPr lang="ru-RU" altLang="ru-RU"/>
           </a:p>
@@ -2813,7 +2814,7 @@
           <a:p>
             <a:fld id="{B49ACDD0-2D53-4EB1-8DC6-20E033B04529}" type="datetime1">
               <a:rPr lang="en-US" altLang="ru-RU" smtClean="0"/>
-              <a:t>4/6/2024</a:t>
+              <a:t>4/9/2024</a:t>
             </a:fld>
             <a:endParaRPr lang="ru-RU" altLang="ru-RU"/>
           </a:p>
@@ -3107,7 +3108,7 @@
           <a:p>
             <a:fld id="{9C5CBA79-0A8D-4D20-AF38-3F587A968EB8}" type="datetime1">
               <a:rPr lang="en-US" altLang="ru-RU" smtClean="0"/>
-              <a:t>4/6/2024</a:t>
+              <a:t>4/9/2024</a:t>
             </a:fld>
             <a:endParaRPr lang="ru-RU" altLang="ru-RU"/>
           </a:p>
@@ -3294,7 +3295,7 @@
           <a:p>
             <a:fld id="{3E3B755D-FB77-4643-914B-669EF48D4964}" type="datetime1">
               <a:rPr lang="en-US" altLang="ru-RU" smtClean="0"/>
-              <a:t>4/6/2024</a:t>
+              <a:t>4/9/2024</a:t>
             </a:fld>
             <a:endParaRPr lang="en-GB" altLang="ru-RU"/>
           </a:p>
@@ -3563,7 +3564,7 @@
           <a:p>
             <a:fld id="{246EA1D5-F37C-4FDB-BA56-82B6D602F44E}" type="datetime1">
               <a:rPr lang="en-US" altLang="ru-RU" smtClean="0"/>
-              <a:t>4/6/2024</a:t>
+              <a:t>4/9/2024</a:t>
             </a:fld>
             <a:endParaRPr lang="ru-RU" altLang="ru-RU"/>
           </a:p>
@@ -3750,7 +3751,7 @@
           <a:p>
             <a:fld id="{6C53F9ED-C5C9-4844-9BCF-F48B65F14C09}" type="datetime1">
               <a:rPr lang="en-US" altLang="ru-RU" smtClean="0"/>
-              <a:t>4/6/2024</a:t>
+              <a:t>4/9/2024</a:t>
             </a:fld>
             <a:endParaRPr lang="ru-RU" altLang="ru-RU"/>
           </a:p>
@@ -3947,7 +3948,7 @@
           <a:p>
             <a:fld id="{989AB20F-10F9-4312-8D9A-54ECDB83FF67}" type="datetime1">
               <a:rPr lang="en-US" altLang="ru-RU" smtClean="0"/>
-              <a:t>4/6/2024</a:t>
+              <a:t>4/9/2024</a:t>
             </a:fld>
             <a:endParaRPr lang="ru-RU" altLang="ru-RU"/>
           </a:p>
@@ -4156,7 +4157,7 @@
           <a:p>
             <a:fld id="{5D61AD41-2BDD-48AA-978A-97D809C82443}" type="datetime1">
               <a:rPr lang="en-US" altLang="ru-RU" smtClean="0"/>
-              <a:t>4/6/2024</a:t>
+              <a:t>4/9/2024</a:t>
             </a:fld>
             <a:endParaRPr lang="en-GB" altLang="ru-RU"/>
           </a:p>
@@ -4460,7 +4461,7 @@
           <a:p>
             <a:fld id="{23E3E7E3-1628-4202-8390-DF6BBD9CD151}" type="datetime1">
               <a:rPr lang="en-US" altLang="ru-RU" smtClean="0"/>
-              <a:t>4/6/2024</a:t>
+              <a:t>4/9/2024</a:t>
             </a:fld>
             <a:endParaRPr lang="en-GB" altLang="ru-RU"/>
           </a:p>
@@ -4903,7 +4904,7 @@
           <a:p>
             <a:fld id="{A99C8BA0-5F07-4249-B95D-AFA98C0D1450}" type="datetime1">
               <a:rPr lang="en-US" altLang="ru-RU" smtClean="0"/>
-              <a:t>4/6/2024</a:t>
+              <a:t>4/9/2024</a:t>
             </a:fld>
             <a:endParaRPr lang="en-GB" altLang="ru-RU"/>
           </a:p>
@@ -5037,7 +5038,7 @@
           <a:p>
             <a:fld id="{7A7F9532-FD34-49C0-8919-DA0C1E36E685}" type="datetime1">
               <a:rPr lang="en-US" altLang="ru-RU" smtClean="0"/>
-              <a:t>4/6/2024</a:t>
+              <a:t>4/9/2024</a:t>
             </a:fld>
             <a:endParaRPr lang="en-GB" altLang="ru-RU"/>
           </a:p>
@@ -5148,7 +5149,7 @@
           <a:p>
             <a:fld id="{877A8A69-6A19-463D-8157-306ABD8C4FAA}" type="datetime1">
               <a:rPr lang="en-US" altLang="ru-RU" smtClean="0"/>
-              <a:t>4/6/2024</a:t>
+              <a:t>4/9/2024</a:t>
             </a:fld>
             <a:endParaRPr lang="en-GB" altLang="ru-RU"/>
           </a:p>
@@ -5441,7 +5442,7 @@
           <a:p>
             <a:fld id="{3BFD1227-03FC-4454-BFB0-FB70D5C45B19}" type="datetime1">
               <a:rPr lang="en-US" altLang="ru-RU" smtClean="0"/>
-              <a:t>4/6/2024</a:t>
+              <a:t>4/9/2024</a:t>
             </a:fld>
             <a:endParaRPr lang="en-GB" altLang="ru-RU"/>
           </a:p>
@@ -5714,7 +5715,7 @@
           <a:p>
             <a:fld id="{2C17D5DB-9BB3-41E7-A98B-4B7D72DD0942}" type="datetime1">
               <a:rPr lang="en-US" altLang="ru-RU" smtClean="0"/>
-              <a:t>4/6/2024</a:t>
+              <a:t>4/9/2024</a:t>
             </a:fld>
             <a:endParaRPr lang="en-GB" altLang="ru-RU"/>
           </a:p>
@@ -6058,7 +6059,7 @@
             <a:fld id="{E852E869-5AD1-440C-888A-2943A7DEBD36}" type="datetime1">
               <a:rPr lang="en-US" altLang="ru-RU" smtClean="0"/>
               <a:pPr/>
-              <a:t>4/6/2024</a:t>
+              <a:t>4/9/2024</a:t>
             </a:fld>
             <a:endParaRPr lang="en-GB" altLang="ru-RU"/>
           </a:p>
@@ -6877,7 +6878,7 @@
             <a:fld id="{F84E6CD6-FACD-4797-A1B9-01B295F8BEF6}" type="datetime1">
               <a:rPr lang="en-US" altLang="ru-RU" smtClean="0"/>
               <a:pPr/>
-              <a:t>4/6/2024</a:t>
+              <a:t>4/9/2024</a:t>
             </a:fld>
             <a:endParaRPr lang="ru-RU" altLang="ru-RU"/>
           </a:p>
@@ -7800,7 +7801,7 @@
           <a:p>
             <a:fld id="{1DC2B165-2EE1-4FB2-B9BF-05EE26C42DCD}" type="datetime1">
               <a:rPr lang="en-US" altLang="ru-RU" smtClean="0"/>
-              <a:t>4/6/2024</a:t>
+              <a:t>4/9/2024</a:t>
             </a:fld>
             <a:endParaRPr lang="ru-RU" altLang="ru-RU"/>
           </a:p>
@@ -7871,7 +7872,7 @@
           <p:cNvPr id="2" name="Tytuł 1">
             <a:extLst>
               <a:ext uri="{FF2B5EF4-FFF2-40B4-BE49-F238E27FC236}">
-                <a16:creationId xmlns:a16="http://schemas.microsoft.com/office/drawing/2014/main" id="{FDFCB221-0D2C-9F6C-7743-FE32A8847931}"/>
+                <a16:creationId xmlns:a16="http://schemas.microsoft.com/office/drawing/2014/main" id="{B48741FA-0535-6848-5183-B21074B169F5}"/>
               </a:ext>
             </a:extLst>
           </p:cNvPr>
@@ -7889,7 +7890,7 @@
           <a:p>
             <a:r>
               <a:rPr lang="pl-PL" sz="2800" dirty="0"/>
-              <a:t>Stopień zaawansowania - oprogramowanie</a:t>
+              <a:t>Stopień zaawansowania - mechanika</a:t>
             </a:r>
           </a:p>
         </p:txBody>
@@ -7899,7 +7900,7 @@
           <p:cNvPr id="3" name="Symbol zastępczy zawartości 2">
             <a:extLst>
               <a:ext uri="{FF2B5EF4-FFF2-40B4-BE49-F238E27FC236}">
-                <a16:creationId xmlns:a16="http://schemas.microsoft.com/office/drawing/2014/main" id="{0E3135C2-921A-1BFC-0982-15447DD40605}"/>
+                <a16:creationId xmlns:a16="http://schemas.microsoft.com/office/drawing/2014/main" id="{98A2C647-EEF0-842A-A509-8D696AFC4B1A}"/>
               </a:ext>
             </a:extLst>
           </p:cNvPr>
@@ -7920,23 +7921,23 @@
             </a:pPr>
             <a:r>
               <a:rPr lang="pl-PL" dirty="0"/>
-              <a:t>(tu wklej struktury danych, wątki oraz generalnie </a:t>
+              <a:t>(tu wklej </a:t>
             </a:r>
             <a:r>
               <a:rPr lang="pl-PL" dirty="0" err="1"/>
-              <a:t>maina</a:t>
+              <a:t>ss</a:t>
             </a:r>
             <a:r>
               <a:rPr lang="pl-PL" dirty="0"/>
-              <a:t> żeby pokazać że nie korzystamy z </a:t>
+              <a:t> z </a:t>
             </a:r>
             <a:r>
               <a:rPr lang="pl-PL" dirty="0" err="1"/>
-              <a:t>delay’ów</a:t>
+              <a:t>inventora</a:t>
             </a:r>
             <a:r>
               <a:rPr lang="pl-PL" dirty="0"/>
-              <a:t> w pętli głównej)</a:t>
+              <a:t>)</a:t>
             </a:r>
           </a:p>
         </p:txBody>
@@ -7946,7 +7947,7 @@
           <p:cNvPr id="4" name="Symbol zastępczy daty 3">
             <a:extLst>
               <a:ext uri="{FF2B5EF4-FFF2-40B4-BE49-F238E27FC236}">
-                <a16:creationId xmlns:a16="http://schemas.microsoft.com/office/drawing/2014/main" id="{19C98573-8DED-86F7-D98F-EA5EDF676F0A}"/>
+                <a16:creationId xmlns:a16="http://schemas.microsoft.com/office/drawing/2014/main" id="{F0386C74-7C99-C78C-B2CF-4E43993EA9F8}"/>
               </a:ext>
             </a:extLst>
           </p:cNvPr>
@@ -7964,7 +7965,7 @@
           <a:p>
             <a:fld id="{1DC2B165-2EE1-4FB2-B9BF-05EE26C42DCD}" type="datetime1">
               <a:rPr lang="en-US" altLang="ru-RU" smtClean="0"/>
-              <a:t>4/6/2024</a:t>
+              <a:t>4/9/2024</a:t>
             </a:fld>
             <a:endParaRPr lang="ru-RU" altLang="ru-RU"/>
           </a:p>
@@ -7975,7 +7976,7 @@
           <p:cNvPr id="6" name="Symbol zastępczy numeru slajdu 5">
             <a:extLst>
               <a:ext uri="{FF2B5EF4-FFF2-40B4-BE49-F238E27FC236}">
-                <a16:creationId xmlns:a16="http://schemas.microsoft.com/office/drawing/2014/main" id="{1E5C6129-7077-9244-48AF-4570A15B0AA0}"/>
+                <a16:creationId xmlns:a16="http://schemas.microsoft.com/office/drawing/2014/main" id="{85E396BC-C5FA-8667-68B8-7556CA5C82FF}"/>
               </a:ext>
             </a:extLst>
           </p:cNvPr>
@@ -8003,7 +8004,7 @@
     </p:spTree>
     <p:extLst>
       <p:ext uri="{BB962C8B-B14F-4D97-AF65-F5344CB8AC3E}">
-        <p14:creationId xmlns:p14="http://schemas.microsoft.com/office/powerpoint/2010/main" val="606808306"/>
+        <p14:creationId xmlns:p14="http://schemas.microsoft.com/office/powerpoint/2010/main" val="2478951324"/>
       </p:ext>
     </p:extLst>
   </p:cSld>
@@ -8035,7 +8036,7 @@
           <p:cNvPr id="2" name="Tytuł 1">
             <a:extLst>
               <a:ext uri="{FF2B5EF4-FFF2-40B4-BE49-F238E27FC236}">
-                <a16:creationId xmlns:a16="http://schemas.microsoft.com/office/drawing/2014/main" id="{B48741FA-0535-6848-5183-B21074B169F5}"/>
+                <a16:creationId xmlns:a16="http://schemas.microsoft.com/office/drawing/2014/main" id="{83EDACE9-FE45-8A73-242D-9A4A20E9950B}"/>
               </a:ext>
             </a:extLst>
           </p:cNvPr>
@@ -8053,7 +8054,7 @@
           <a:p>
             <a:r>
               <a:rPr lang="pl-PL" sz="2800" dirty="0"/>
-              <a:t>Stopień zaawansowania - mechanika</a:t>
+              <a:t>Napotkane problemy i ich rozwiązania</a:t>
             </a:r>
           </a:p>
         </p:txBody>
@@ -8063,7 +8064,7 @@
           <p:cNvPr id="3" name="Symbol zastępczy zawartości 2">
             <a:extLst>
               <a:ext uri="{FF2B5EF4-FFF2-40B4-BE49-F238E27FC236}">
-                <a16:creationId xmlns:a16="http://schemas.microsoft.com/office/drawing/2014/main" id="{98A2C647-EEF0-842A-A509-8D696AFC4B1A}"/>
+                <a16:creationId xmlns:a16="http://schemas.microsoft.com/office/drawing/2014/main" id="{12319295-100A-3270-CE8E-6472E6385464}"/>
               </a:ext>
             </a:extLst>
           </p:cNvPr>
@@ -8079,28 +8080,9 @@
           <a:bodyPr/>
           <a:lstStyle/>
           <a:p>
-            <a:pPr marL="0" indent="0">
-              <a:buNone/>
-            </a:pPr>
             <a:r>
               <a:rPr lang="pl-PL" dirty="0"/>
-              <a:t>(tu wklej </a:t>
-            </a:r>
-            <a:r>
-              <a:rPr lang="pl-PL" dirty="0" err="1"/>
-              <a:t>ss</a:t>
-            </a:r>
-            <a:r>
-              <a:rPr lang="pl-PL" dirty="0"/>
-              <a:t> z </a:t>
-            </a:r>
-            <a:r>
-              <a:rPr lang="pl-PL" dirty="0" err="1"/>
-              <a:t>inventora</a:t>
-            </a:r>
-            <a:r>
-              <a:rPr lang="pl-PL" dirty="0"/>
-              <a:t>)</a:t>
+              <a:t>(Tu Daniel coś wstawia)</a:t>
             </a:r>
           </a:p>
         </p:txBody>
@@ -8110,7 +8092,7 @@
           <p:cNvPr id="4" name="Symbol zastępczy daty 3">
             <a:extLst>
               <a:ext uri="{FF2B5EF4-FFF2-40B4-BE49-F238E27FC236}">
-                <a16:creationId xmlns:a16="http://schemas.microsoft.com/office/drawing/2014/main" id="{F0386C74-7C99-C78C-B2CF-4E43993EA9F8}"/>
+                <a16:creationId xmlns:a16="http://schemas.microsoft.com/office/drawing/2014/main" id="{82870BFD-05AF-DC1C-CC78-61C7C9E9341C}"/>
               </a:ext>
             </a:extLst>
           </p:cNvPr>
@@ -8128,7 +8110,7 @@
           <a:p>
             <a:fld id="{1DC2B165-2EE1-4FB2-B9BF-05EE26C42DCD}" type="datetime1">
               <a:rPr lang="en-US" altLang="ru-RU" smtClean="0"/>
-              <a:t>4/6/2024</a:t>
+              <a:t>4/9/2024</a:t>
             </a:fld>
             <a:endParaRPr lang="ru-RU" altLang="ru-RU"/>
           </a:p>
@@ -8139,7 +8121,7 @@
           <p:cNvPr id="6" name="Symbol zastępczy numeru slajdu 5">
             <a:extLst>
               <a:ext uri="{FF2B5EF4-FFF2-40B4-BE49-F238E27FC236}">
-                <a16:creationId xmlns:a16="http://schemas.microsoft.com/office/drawing/2014/main" id="{85E396BC-C5FA-8667-68B8-7556CA5C82FF}"/>
+                <a16:creationId xmlns:a16="http://schemas.microsoft.com/office/drawing/2014/main" id="{A6E781AB-5745-D568-E94E-57D8F0D2F9AE}"/>
               </a:ext>
             </a:extLst>
           </p:cNvPr>
@@ -8167,7 +8149,7 @@
     </p:spTree>
     <p:extLst>
       <p:ext uri="{BB962C8B-B14F-4D97-AF65-F5344CB8AC3E}">
-        <p14:creationId xmlns:p14="http://schemas.microsoft.com/office/powerpoint/2010/main" val="2478951324"/>
+        <p14:creationId xmlns:p14="http://schemas.microsoft.com/office/powerpoint/2010/main" val="2416298997"/>
       </p:ext>
     </p:extLst>
   </p:cSld>
@@ -8199,6 +8181,472 @@
           <p:cNvPr id="2" name="Tytuł 1">
             <a:extLst>
               <a:ext uri="{FF2B5EF4-FFF2-40B4-BE49-F238E27FC236}">
+                <a16:creationId xmlns:a16="http://schemas.microsoft.com/office/drawing/2014/main" id="{FDFCB221-0D2C-9F6C-7743-FE32A8847931}"/>
+              </a:ext>
+            </a:extLst>
+          </p:cNvPr>
+          <p:cNvSpPr>
+            <a:spLocks noGrp="1"/>
+          </p:cNvSpPr>
+          <p:nvPr>
+            <p:ph type="title"/>
+          </p:nvPr>
+        </p:nvSpPr>
+        <p:spPr>
+          <a:xfrm>
+            <a:off x="1908175" y="260350"/>
+            <a:ext cx="6767513" cy="1143000"/>
+          </a:xfrm>
+        </p:spPr>
+        <p:txBody>
+          <a:bodyPr wrap="square" anchor="ctr">
+            <a:normAutofit/>
+          </a:bodyPr>
+          <a:lstStyle/>
+          <a:p>
+            <a:r>
+              <a:rPr lang="pl-PL"/>
+              <a:t>Stopień zaawansowania - oprogramowanie</a:t>
+            </a:r>
+          </a:p>
+        </p:txBody>
+      </p:sp>
+      <p:sp>
+        <p:nvSpPr>
+          <p:cNvPr id="8" name="Symbol zastępczy zawartości 7">
+            <a:extLst>
+              <a:ext uri="{FF2B5EF4-FFF2-40B4-BE49-F238E27FC236}">
+                <a16:creationId xmlns:a16="http://schemas.microsoft.com/office/drawing/2014/main" id="{DB951D2C-948B-4CC5-28A5-EDD1BC6D0142}"/>
+              </a:ext>
+            </a:extLst>
+          </p:cNvPr>
+          <p:cNvSpPr>
+            <a:spLocks noGrp="1"/>
+          </p:cNvSpPr>
+          <p:nvPr>
+            <p:ph sz="half" idx="1"/>
+          </p:nvPr>
+        </p:nvSpPr>
+        <p:spPr>
+          <a:xfrm>
+            <a:off x="1908175" y="1600200"/>
+            <a:ext cx="3313113" cy="4525963"/>
+          </a:xfrm>
+        </p:spPr>
+        <p:txBody>
+          <a:bodyPr wrap="square" anchor="t">
+            <a:normAutofit/>
+          </a:bodyPr>
+          <a:lstStyle/>
+          <a:p>
+            <a:endParaRPr lang="pl-PL" dirty="0"/>
+          </a:p>
+          <a:p>
+            <a:endParaRPr lang="pl-PL" dirty="0"/>
+          </a:p>
+        </p:txBody>
+      </p:sp>
+      <p:pic>
+        <p:nvPicPr>
+          <p:cNvPr id="12" name="Symbol zastępczy zawartości 11">
+            <a:extLst>
+              <a:ext uri="{FF2B5EF4-FFF2-40B4-BE49-F238E27FC236}">
+                <a16:creationId xmlns:a16="http://schemas.microsoft.com/office/drawing/2014/main" id="{4A515364-E538-6301-553F-9364EB55048F}"/>
+              </a:ext>
+            </a:extLst>
+          </p:cNvPr>
+          <p:cNvPicPr>
+            <a:picLocks noGrp="1" noChangeAspect="1"/>
+          </p:cNvPicPr>
+          <p:nvPr>
+            <p:ph sz="half" idx="2"/>
+          </p:nvPr>
+        </p:nvPicPr>
+        <p:blipFill>
+          <a:blip r:embed="rId2"/>
+          <a:stretch>
+            <a:fillRect/>
+          </a:stretch>
+        </p:blipFill>
+        <p:spPr>
+          <a:xfrm>
+            <a:off x="2010560" y="3928921"/>
+            <a:ext cx="6562742" cy="2496935"/>
+          </a:xfrm>
+        </p:spPr>
+      </p:pic>
+      <p:sp>
+        <p:nvSpPr>
+          <p:cNvPr id="4" name="Symbol zastępczy daty 3">
+            <a:extLst>
+              <a:ext uri="{FF2B5EF4-FFF2-40B4-BE49-F238E27FC236}">
+                <a16:creationId xmlns:a16="http://schemas.microsoft.com/office/drawing/2014/main" id="{19C98573-8DED-86F7-D98F-EA5EDF676F0A}"/>
+              </a:ext>
+            </a:extLst>
+          </p:cNvPr>
+          <p:cNvSpPr>
+            <a:spLocks noGrp="1"/>
+          </p:cNvSpPr>
+          <p:nvPr>
+            <p:ph type="dt" sz="half" idx="10"/>
+          </p:nvPr>
+        </p:nvSpPr>
+        <p:spPr>
+          <a:xfrm>
+            <a:off x="457200" y="6453188"/>
+            <a:ext cx="2133600" cy="268287"/>
+          </a:xfrm>
+        </p:spPr>
+        <p:txBody>
+          <a:bodyPr wrap="square" anchor="t">
+            <a:normAutofit/>
+          </a:bodyPr>
+          <a:lstStyle/>
+          <a:p>
+            <a:pPr>
+              <a:spcAft>
+                <a:spcPts val="600"/>
+              </a:spcAft>
+            </a:pPr>
+            <a:fld id="{1DC2B165-2EE1-4FB2-B9BF-05EE26C42DCD}" type="datetime1">
+              <a:rPr lang="en-US" altLang="ru-RU" smtClean="0"/>
+              <a:pPr>
+                <a:spcAft>
+                  <a:spcPts val="600"/>
+                </a:spcAft>
+              </a:pPr>
+              <a:t>4/9/2024</a:t>
+            </a:fld>
+            <a:endParaRPr lang="ru-RU" altLang="ru-RU"/>
+          </a:p>
+        </p:txBody>
+      </p:sp>
+      <p:sp>
+        <p:nvSpPr>
+          <p:cNvPr id="15" name="Footer Placeholder 5">
+            <a:extLst>
+              <a:ext uri="{FF2B5EF4-FFF2-40B4-BE49-F238E27FC236}">
+                <a16:creationId xmlns:a16="http://schemas.microsoft.com/office/drawing/2014/main" id="{0ACBDB0B-DBEC-6ED1-E381-09D3FFFE9936}"/>
+              </a:ext>
+            </a:extLst>
+          </p:cNvPr>
+          <p:cNvSpPr>
+            <a:spLocks noGrp="1"/>
+          </p:cNvSpPr>
+          <p:nvPr>
+            <p:ph type="ftr" sz="quarter" idx="11"/>
+          </p:nvPr>
+        </p:nvSpPr>
+        <p:spPr>
+          <a:xfrm>
+            <a:off x="3124200" y="6453188"/>
+            <a:ext cx="2895600" cy="268287"/>
+          </a:xfrm>
+        </p:spPr>
+        <p:txBody>
+          <a:bodyPr/>
+          <a:lstStyle/>
+          <a:p>
+            <a:pPr>
+              <a:spcAft>
+                <a:spcPts val="600"/>
+              </a:spcAft>
+            </a:pPr>
+            <a:r>
+              <a:rPr lang="en-US" altLang="ru-RU"/>
+              <a:t>Designed by PoweredTemplate.com</a:t>
+            </a:r>
+            <a:endParaRPr lang="ru-RU" altLang="ru-RU"/>
+          </a:p>
+        </p:txBody>
+      </p:sp>
+      <p:sp>
+        <p:nvSpPr>
+          <p:cNvPr id="6" name="Symbol zastępczy numeru slajdu 5">
+            <a:extLst>
+              <a:ext uri="{FF2B5EF4-FFF2-40B4-BE49-F238E27FC236}">
+                <a16:creationId xmlns:a16="http://schemas.microsoft.com/office/drawing/2014/main" id="{1E5C6129-7077-9244-48AF-4570A15B0AA0}"/>
+              </a:ext>
+            </a:extLst>
+          </p:cNvPr>
+          <p:cNvSpPr>
+            <a:spLocks noGrp="1"/>
+          </p:cNvSpPr>
+          <p:nvPr>
+            <p:ph type="sldNum" sz="quarter" idx="12"/>
+          </p:nvPr>
+        </p:nvSpPr>
+        <p:spPr>
+          <a:xfrm>
+            <a:off x="6553200" y="6453188"/>
+            <a:ext cx="2133600" cy="268287"/>
+          </a:xfrm>
+        </p:spPr>
+        <p:txBody>
+          <a:bodyPr wrap="square" anchor="t">
+            <a:normAutofit/>
+          </a:bodyPr>
+          <a:lstStyle/>
+          <a:p>
+            <a:pPr>
+              <a:spcAft>
+                <a:spcPts val="600"/>
+              </a:spcAft>
+            </a:pPr>
+            <a:fld id="{56DCF0CF-EF45-4A27-9606-CCDDC891BE7E}" type="slidenum">
+              <a:rPr lang="ru-RU" altLang="ru-RU" smtClean="0"/>
+              <a:pPr>
+                <a:spcAft>
+                  <a:spcPts val="600"/>
+                </a:spcAft>
+              </a:pPr>
+              <a:t>5</a:t>
+            </a:fld>
+            <a:endParaRPr lang="ru-RU" altLang="ru-RU"/>
+          </a:p>
+        </p:txBody>
+      </p:sp>
+      <p:pic>
+        <p:nvPicPr>
+          <p:cNvPr id="16" name="Obraz 15">
+            <a:extLst>
+              <a:ext uri="{FF2B5EF4-FFF2-40B4-BE49-F238E27FC236}">
+                <a16:creationId xmlns:a16="http://schemas.microsoft.com/office/drawing/2014/main" id="{CAB2BAC9-8809-C167-7593-6004326CD341}"/>
+              </a:ext>
+            </a:extLst>
+          </p:cNvPr>
+          <p:cNvPicPr>
+            <a:picLocks noChangeAspect="1"/>
+          </p:cNvPicPr>
+          <p:nvPr/>
+        </p:nvPicPr>
+        <p:blipFill>
+          <a:blip r:embed="rId3"/>
+          <a:stretch>
+            <a:fillRect/>
+          </a:stretch>
+        </p:blipFill>
+        <p:spPr>
+          <a:xfrm>
+            <a:off x="3818185" y="1349743"/>
+            <a:ext cx="2947492" cy="2480753"/>
+          </a:xfrm>
+          <a:prstGeom prst="rect">
+            <a:avLst/>
+          </a:prstGeom>
+        </p:spPr>
+      </p:pic>
+    </p:spTree>
+    <p:extLst>
+      <p:ext uri="{BB962C8B-B14F-4D97-AF65-F5344CB8AC3E}">
+        <p14:creationId xmlns:p14="http://schemas.microsoft.com/office/powerpoint/2010/main" val="606808306"/>
+      </p:ext>
+    </p:extLst>
+  </p:cSld>
+  <p:clrMapOvr>
+    <a:masterClrMapping/>
+  </p:clrMapOvr>
+</p:sld>
+</file>
+
+<file path=ppt/slides/slide6.xml><?xml version="1.0" encoding="utf-8"?>
+<p:sld xmlns:a="http://schemas.openxmlformats.org/drawingml/2006/main" xmlns:r="http://schemas.openxmlformats.org/officeDocument/2006/relationships" xmlns:p="http://schemas.openxmlformats.org/presentationml/2006/main">
+  <p:cSld>
+    <p:spTree>
+      <p:nvGrpSpPr>
+        <p:cNvPr id="1" name=""/>
+        <p:cNvGrpSpPr/>
+        <p:nvPr/>
+      </p:nvGrpSpPr>
+      <p:grpSpPr>
+        <a:xfrm>
+          <a:off x="0" y="0"/>
+          <a:ext cx="0" cy="0"/>
+          <a:chOff x="0" y="0"/>
+          <a:chExt cx="0" cy="0"/>
+        </a:xfrm>
+      </p:grpSpPr>
+      <p:sp>
+        <p:nvSpPr>
+          <p:cNvPr id="2" name="Tytuł 1">
+            <a:extLst>
+              <a:ext uri="{FF2B5EF4-FFF2-40B4-BE49-F238E27FC236}">
+                <a16:creationId xmlns:a16="http://schemas.microsoft.com/office/drawing/2014/main" id="{FDFCB221-0D2C-9F6C-7743-FE32A8847931}"/>
+              </a:ext>
+            </a:extLst>
+          </p:cNvPr>
+          <p:cNvSpPr>
+            <a:spLocks noGrp="1"/>
+          </p:cNvSpPr>
+          <p:nvPr>
+            <p:ph type="title"/>
+          </p:nvPr>
+        </p:nvSpPr>
+        <p:spPr/>
+        <p:txBody>
+          <a:bodyPr/>
+          <a:lstStyle/>
+          <a:p>
+            <a:r>
+              <a:rPr lang="pl-PL" sz="2800" dirty="0"/>
+              <a:t>Stopień zaawansowania - oprogramowanie</a:t>
+            </a:r>
+          </a:p>
+        </p:txBody>
+      </p:sp>
+      <p:pic>
+        <p:nvPicPr>
+          <p:cNvPr id="7" name="Symbol zastępczy zawartości 6">
+            <a:extLst>
+              <a:ext uri="{FF2B5EF4-FFF2-40B4-BE49-F238E27FC236}">
+                <a16:creationId xmlns:a16="http://schemas.microsoft.com/office/drawing/2014/main" id="{8F614E8E-6A5B-A01C-E443-A29E509151F3}"/>
+              </a:ext>
+            </a:extLst>
+          </p:cNvPr>
+          <p:cNvPicPr>
+            <a:picLocks noGrp="1" noChangeAspect="1"/>
+          </p:cNvPicPr>
+          <p:nvPr>
+            <p:ph idx="1"/>
+          </p:nvPr>
+        </p:nvPicPr>
+        <p:blipFill>
+          <a:blip r:embed="rId2"/>
+          <a:stretch>
+            <a:fillRect/>
+          </a:stretch>
+        </p:blipFill>
+        <p:spPr>
+          <a:xfrm>
+            <a:off x="1903495" y="1268760"/>
+            <a:ext cx="3794927" cy="3629000"/>
+          </a:xfrm>
+        </p:spPr>
+      </p:pic>
+      <p:sp>
+        <p:nvSpPr>
+          <p:cNvPr id="4" name="Symbol zastępczy daty 3">
+            <a:extLst>
+              <a:ext uri="{FF2B5EF4-FFF2-40B4-BE49-F238E27FC236}">
+                <a16:creationId xmlns:a16="http://schemas.microsoft.com/office/drawing/2014/main" id="{19C98573-8DED-86F7-D98F-EA5EDF676F0A}"/>
+              </a:ext>
+            </a:extLst>
+          </p:cNvPr>
+          <p:cNvSpPr>
+            <a:spLocks noGrp="1"/>
+          </p:cNvSpPr>
+          <p:nvPr>
+            <p:ph type="dt" sz="half" idx="10"/>
+          </p:nvPr>
+        </p:nvSpPr>
+        <p:spPr/>
+        <p:txBody>
+          <a:bodyPr/>
+          <a:lstStyle/>
+          <a:p>
+            <a:fld id="{1DC2B165-2EE1-4FB2-B9BF-05EE26C42DCD}" type="datetime1">
+              <a:rPr lang="en-US" altLang="ru-RU" smtClean="0"/>
+              <a:t>4/9/2024</a:t>
+            </a:fld>
+            <a:endParaRPr lang="ru-RU" altLang="ru-RU"/>
+          </a:p>
+        </p:txBody>
+      </p:sp>
+      <p:sp>
+        <p:nvSpPr>
+          <p:cNvPr id="6" name="Symbol zastępczy numeru slajdu 5">
+            <a:extLst>
+              <a:ext uri="{FF2B5EF4-FFF2-40B4-BE49-F238E27FC236}">
+                <a16:creationId xmlns:a16="http://schemas.microsoft.com/office/drawing/2014/main" id="{1E5C6129-7077-9244-48AF-4570A15B0AA0}"/>
+              </a:ext>
+            </a:extLst>
+          </p:cNvPr>
+          <p:cNvSpPr>
+            <a:spLocks noGrp="1"/>
+          </p:cNvSpPr>
+          <p:nvPr>
+            <p:ph type="sldNum" sz="quarter" idx="12"/>
+          </p:nvPr>
+        </p:nvSpPr>
+        <p:spPr/>
+        <p:txBody>
+          <a:bodyPr/>
+          <a:lstStyle/>
+          <a:p>
+            <a:fld id="{56DCF0CF-EF45-4A27-9606-CCDDC891BE7E}" type="slidenum">
+              <a:rPr lang="ru-RU" altLang="ru-RU" smtClean="0"/>
+              <a:pPr/>
+              <a:t>6</a:t>
+            </a:fld>
+            <a:endParaRPr lang="ru-RU" altLang="ru-RU"/>
+          </a:p>
+        </p:txBody>
+      </p:sp>
+      <p:pic>
+        <p:nvPicPr>
+          <p:cNvPr id="9" name="Obraz 8">
+            <a:extLst>
+              <a:ext uri="{FF2B5EF4-FFF2-40B4-BE49-F238E27FC236}">
+                <a16:creationId xmlns:a16="http://schemas.microsoft.com/office/drawing/2014/main" id="{096B0090-94D9-AE8F-3486-F705A5C0EFF5}"/>
+              </a:ext>
+            </a:extLst>
+          </p:cNvPr>
+          <p:cNvPicPr>
+            <a:picLocks noChangeAspect="1"/>
+          </p:cNvPicPr>
+          <p:nvPr/>
+        </p:nvPicPr>
+        <p:blipFill>
+          <a:blip r:embed="rId3"/>
+          <a:stretch>
+            <a:fillRect/>
+          </a:stretch>
+        </p:blipFill>
+        <p:spPr>
+          <a:xfrm>
+            <a:off x="5693482" y="1268760"/>
+            <a:ext cx="3445284" cy="5454650"/>
+          </a:xfrm>
+          <a:prstGeom prst="rect">
+            <a:avLst/>
+          </a:prstGeom>
+        </p:spPr>
+      </p:pic>
+    </p:spTree>
+    <p:extLst>
+      <p:ext uri="{BB962C8B-B14F-4D97-AF65-F5344CB8AC3E}">
+        <p14:creationId xmlns:p14="http://schemas.microsoft.com/office/powerpoint/2010/main" val="3400243067"/>
+      </p:ext>
+    </p:extLst>
+  </p:cSld>
+  <p:clrMapOvr>
+    <a:masterClrMapping/>
+  </p:clrMapOvr>
+</p:sld>
+</file>
+
+<file path=ppt/slides/slide7.xml><?xml version="1.0" encoding="utf-8"?>
+<p:sld xmlns:a="http://schemas.openxmlformats.org/drawingml/2006/main" xmlns:r="http://schemas.openxmlformats.org/officeDocument/2006/relationships" xmlns:p="http://schemas.openxmlformats.org/presentationml/2006/main">
+  <p:cSld>
+    <p:spTree>
+      <p:nvGrpSpPr>
+        <p:cNvPr id="1" name=""/>
+        <p:cNvGrpSpPr/>
+        <p:nvPr/>
+      </p:nvGrpSpPr>
+      <p:grpSpPr>
+        <a:xfrm>
+          <a:off x="0" y="0"/>
+          <a:ext cx="0" cy="0"/>
+          <a:chOff x="0" y="0"/>
+          <a:chExt cx="0" cy="0"/>
+        </a:xfrm>
+      </p:grpSpPr>
+      <p:sp>
+        <p:nvSpPr>
+          <p:cNvPr id="2" name="Tytuł 1">
+            <a:extLst>
+              <a:ext uri="{FF2B5EF4-FFF2-40B4-BE49-F238E27FC236}">
                 <a16:creationId xmlns:a16="http://schemas.microsoft.com/office/drawing/2014/main" id="{58A638FE-094E-5884-66F2-263B88A016CB}"/>
               </a:ext>
             </a:extLst>
@@ -8273,7 +8721,7 @@
           <a:p>
             <a:fld id="{1DC2B165-2EE1-4FB2-B9BF-05EE26C42DCD}" type="datetime1">
               <a:rPr lang="en-US" altLang="ru-RU" smtClean="0"/>
-              <a:t>4/6/2024</a:t>
+              <a:t>4/9/2024</a:t>
             </a:fld>
             <a:endParaRPr lang="ru-RU" altLang="ru-RU"/>
           </a:p>
@@ -8303,7 +8751,7 @@
             <a:fld id="{56DCF0CF-EF45-4A27-9606-CCDDC891BE7E}" type="slidenum">
               <a:rPr lang="ru-RU" altLang="ru-RU" smtClean="0"/>
               <a:pPr/>
-              <a:t>5</a:t>
+              <a:t>7</a:t>
             </a:fld>
             <a:endParaRPr lang="ru-RU" altLang="ru-RU"/>
           </a:p>
@@ -8382,7 +8830,7 @@
 </p:sld>
 </file>
 
-<file path=ppt/slides/slide6.xml><?xml version="1.0" encoding="utf-8"?>
+<file path=ppt/slides/slide8.xml><?xml version="1.0" encoding="utf-8"?>
 <p:sld xmlns:a="http://schemas.openxmlformats.org/drawingml/2006/main" xmlns:r="http://schemas.openxmlformats.org/officeDocument/2006/relationships" xmlns:p="http://schemas.openxmlformats.org/presentationml/2006/main">
   <p:cSld>
     <p:spTree>
@@ -8404,151 +8852,6 @@
           <p:cNvPr id="2" name="Tytuł 1">
             <a:extLst>
               <a:ext uri="{FF2B5EF4-FFF2-40B4-BE49-F238E27FC236}">
-                <a16:creationId xmlns:a16="http://schemas.microsoft.com/office/drawing/2014/main" id="{83EDACE9-FE45-8A73-242D-9A4A20E9950B}"/>
-              </a:ext>
-            </a:extLst>
-          </p:cNvPr>
-          <p:cNvSpPr>
-            <a:spLocks noGrp="1"/>
-          </p:cNvSpPr>
-          <p:nvPr>
-            <p:ph type="title"/>
-          </p:nvPr>
-        </p:nvSpPr>
-        <p:spPr/>
-        <p:txBody>
-          <a:bodyPr/>
-          <a:lstStyle/>
-          <a:p>
-            <a:r>
-              <a:rPr lang="pl-PL" sz="2800" dirty="0"/>
-              <a:t>Napotkane problemy i ich rozwiązania</a:t>
-            </a:r>
-          </a:p>
-        </p:txBody>
-      </p:sp>
-      <p:sp>
-        <p:nvSpPr>
-          <p:cNvPr id="3" name="Symbol zastępczy zawartości 2">
-            <a:extLst>
-              <a:ext uri="{FF2B5EF4-FFF2-40B4-BE49-F238E27FC236}">
-                <a16:creationId xmlns:a16="http://schemas.microsoft.com/office/drawing/2014/main" id="{12319295-100A-3270-CE8E-6472E6385464}"/>
-              </a:ext>
-            </a:extLst>
-          </p:cNvPr>
-          <p:cNvSpPr>
-            <a:spLocks noGrp="1"/>
-          </p:cNvSpPr>
-          <p:nvPr>
-            <p:ph idx="1"/>
-          </p:nvPr>
-        </p:nvSpPr>
-        <p:spPr/>
-        <p:txBody>
-          <a:bodyPr/>
-          <a:lstStyle/>
-          <a:p>
-            <a:r>
-              <a:rPr lang="pl-PL" dirty="0"/>
-              <a:t>(Tu Daniel coś wstawia)</a:t>
-            </a:r>
-          </a:p>
-        </p:txBody>
-      </p:sp>
-      <p:sp>
-        <p:nvSpPr>
-          <p:cNvPr id="4" name="Symbol zastępczy daty 3">
-            <a:extLst>
-              <a:ext uri="{FF2B5EF4-FFF2-40B4-BE49-F238E27FC236}">
-                <a16:creationId xmlns:a16="http://schemas.microsoft.com/office/drawing/2014/main" id="{82870BFD-05AF-DC1C-CC78-61C7C9E9341C}"/>
-              </a:ext>
-            </a:extLst>
-          </p:cNvPr>
-          <p:cNvSpPr>
-            <a:spLocks noGrp="1"/>
-          </p:cNvSpPr>
-          <p:nvPr>
-            <p:ph type="dt" sz="half" idx="10"/>
-          </p:nvPr>
-        </p:nvSpPr>
-        <p:spPr/>
-        <p:txBody>
-          <a:bodyPr/>
-          <a:lstStyle/>
-          <a:p>
-            <a:fld id="{1DC2B165-2EE1-4FB2-B9BF-05EE26C42DCD}" type="datetime1">
-              <a:rPr lang="en-US" altLang="ru-RU" smtClean="0"/>
-              <a:t>4/6/2024</a:t>
-            </a:fld>
-            <a:endParaRPr lang="ru-RU" altLang="ru-RU"/>
-          </a:p>
-        </p:txBody>
-      </p:sp>
-      <p:sp>
-        <p:nvSpPr>
-          <p:cNvPr id="6" name="Symbol zastępczy numeru slajdu 5">
-            <a:extLst>
-              <a:ext uri="{FF2B5EF4-FFF2-40B4-BE49-F238E27FC236}">
-                <a16:creationId xmlns:a16="http://schemas.microsoft.com/office/drawing/2014/main" id="{A6E781AB-5745-D568-E94E-57D8F0D2F9AE}"/>
-              </a:ext>
-            </a:extLst>
-          </p:cNvPr>
-          <p:cNvSpPr>
-            <a:spLocks noGrp="1"/>
-          </p:cNvSpPr>
-          <p:nvPr>
-            <p:ph type="sldNum" sz="quarter" idx="12"/>
-          </p:nvPr>
-        </p:nvSpPr>
-        <p:spPr/>
-        <p:txBody>
-          <a:bodyPr/>
-          <a:lstStyle/>
-          <a:p>
-            <a:fld id="{56DCF0CF-EF45-4A27-9606-CCDDC891BE7E}" type="slidenum">
-              <a:rPr lang="ru-RU" altLang="ru-RU" smtClean="0"/>
-              <a:pPr/>
-              <a:t>6</a:t>
-            </a:fld>
-            <a:endParaRPr lang="ru-RU" altLang="ru-RU"/>
-          </a:p>
-        </p:txBody>
-      </p:sp>
-    </p:spTree>
-    <p:extLst>
-      <p:ext uri="{BB962C8B-B14F-4D97-AF65-F5344CB8AC3E}">
-        <p14:creationId xmlns:p14="http://schemas.microsoft.com/office/powerpoint/2010/main" val="2416298997"/>
-      </p:ext>
-    </p:extLst>
-  </p:cSld>
-  <p:clrMapOvr>
-    <a:masterClrMapping/>
-  </p:clrMapOvr>
-</p:sld>
-</file>
-
-<file path=ppt/slides/slide7.xml><?xml version="1.0" encoding="utf-8"?>
-<p:sld xmlns:a="http://schemas.openxmlformats.org/drawingml/2006/main" xmlns:r="http://schemas.openxmlformats.org/officeDocument/2006/relationships" xmlns:p="http://schemas.openxmlformats.org/presentationml/2006/main">
-  <p:cSld>
-    <p:spTree>
-      <p:nvGrpSpPr>
-        <p:cNvPr id="1" name=""/>
-        <p:cNvGrpSpPr/>
-        <p:nvPr/>
-      </p:nvGrpSpPr>
-      <p:grpSpPr>
-        <a:xfrm>
-          <a:off x="0" y="0"/>
-          <a:ext cx="0" cy="0"/>
-          <a:chOff x="0" y="0"/>
-          <a:chExt cx="0" cy="0"/>
-        </a:xfrm>
-      </p:grpSpPr>
-      <p:sp>
-        <p:nvSpPr>
-          <p:cNvPr id="2" name="Tytuł 1">
-            <a:extLst>
-              <a:ext uri="{FF2B5EF4-FFF2-40B4-BE49-F238E27FC236}">
                 <a16:creationId xmlns:a16="http://schemas.microsoft.com/office/drawing/2014/main" id="{6F994F42-940B-98BB-00B1-BEABAF5B769A}"/>
               </a:ext>
             </a:extLst>
@@ -8601,7 +8904,7 @@
           <a:p>
             <a:fld id="{7A7F9532-FD34-49C0-8919-DA0C1E36E685}" type="datetime1">
               <a:rPr lang="en-US" altLang="ru-RU" smtClean="0"/>
-              <a:t>4/6/2024</a:t>
+              <a:t>4/9/2024</a:t>
             </a:fld>
             <a:endParaRPr lang="en-GB" altLang="ru-RU"/>
           </a:p>
@@ -8631,7 +8934,7 @@
             <a:fld id="{69B08B38-D4FA-4A4A-A395-CC8A76A6823F}" type="slidenum">
               <a:rPr lang="en-GB" altLang="ru-RU" smtClean="0"/>
               <a:pPr/>
-              <a:t>7</a:t>
+              <a:t>8</a:t>
             </a:fld>
             <a:endParaRPr lang="en-GB" altLang="ru-RU"/>
           </a:p>

</xml_diff>